<commit_message>
Added Double Init Pic to PPTX
</commit_message>
<xml_diff>
--- a/presentation/WECAN.pptx
+++ b/presentation/WECAN.pptx
@@ -4868,29 +4868,143 @@
           </a:p>
         </p:txBody>
       </p:sp>
-      <p:pic>
-        <p:nvPicPr>
-          <p:cNvPr id="4" name="Picture 3"/>
-          <p:cNvPicPr>
-            <a:picLocks noChangeAspect="1"/>
-          </p:cNvPicPr>
+      <p:grpSp>
+        <p:nvGrpSpPr>
+          <p:cNvPr id="9" name="Group 8"/>
+          <p:cNvGrpSpPr/>
           <p:nvPr/>
-        </p:nvPicPr>
-        <p:blipFill rotWithShape="1">
-          <a:blip r:embed="rId2"/>
-          <a:srcRect l="41558" t="3157" r="1263" b="4308"/>
-          <a:stretch/>
-        </p:blipFill>
-        <p:spPr>
+        </p:nvGrpSpPr>
+        <p:grpSpPr>
           <a:xfrm>
-            <a:off x="2610374" y="2793532"/>
-            <a:ext cx="6971252" cy="3707935"/>
+            <a:off x="2176070" y="2741161"/>
+            <a:ext cx="8050110" cy="3927562"/>
+            <a:chOff x="2176070" y="2715994"/>
+            <a:chExt cx="8050110" cy="3927562"/>
           </a:xfrm>
-          <a:prstGeom prst="rect">
-            <a:avLst/>
-          </a:prstGeom>
-        </p:spPr>
-      </p:pic>
+        </p:grpSpPr>
+        <p:pic>
+          <p:nvPicPr>
+            <p:cNvPr id="6" name="Picture 5"/>
+            <p:cNvPicPr>
+              <a:picLocks noChangeAspect="1"/>
+            </p:cNvPicPr>
+            <p:nvPr/>
+          </p:nvPicPr>
+          <p:blipFill>
+            <a:blip r:embed="rId2">
+              <a:extLst>
+                <a:ext uri="{28A0092B-C50C-407E-A947-70E740481C1C}">
+                  <a14:useLocalDpi xmlns:a14="http://schemas.microsoft.com/office/drawing/2010/main" val="0"/>
+                </a:ext>
+              </a:extLst>
+            </a:blip>
+            <a:stretch>
+              <a:fillRect/>
+            </a:stretch>
+          </p:blipFill>
+          <p:spPr>
+            <a:xfrm>
+              <a:off x="2176070" y="2715994"/>
+              <a:ext cx="8050110" cy="3927562"/>
+            </a:xfrm>
+            <a:prstGeom prst="rect">
+              <a:avLst/>
+            </a:prstGeom>
+          </p:spPr>
+        </p:pic>
+        <p:sp>
+          <p:nvSpPr>
+            <p:cNvPr id="7" name="Rectangle 6"/>
+            <p:cNvSpPr/>
+            <p:nvPr/>
+          </p:nvSpPr>
+          <p:spPr>
+            <a:xfrm>
+              <a:off x="9034943" y="3238150"/>
+              <a:ext cx="1124125" cy="822122"/>
+            </a:xfrm>
+            <a:prstGeom prst="rect">
+              <a:avLst/>
+            </a:prstGeom>
+            <a:noFill/>
+            <a:ln w="57150">
+              <a:solidFill>
+                <a:schemeClr val="accent5"/>
+              </a:solidFill>
+            </a:ln>
+          </p:spPr>
+          <p:style>
+            <a:lnRef idx="2">
+              <a:schemeClr val="accent1">
+                <a:shade val="50000"/>
+              </a:schemeClr>
+            </a:lnRef>
+            <a:fillRef idx="1">
+              <a:schemeClr val="accent1"/>
+            </a:fillRef>
+            <a:effectRef idx="0">
+              <a:schemeClr val="accent1"/>
+            </a:effectRef>
+            <a:fontRef idx="minor">
+              <a:schemeClr val="lt1"/>
+            </a:fontRef>
+          </p:style>
+          <p:txBody>
+            <a:bodyPr rtlCol="0" anchor="ctr"/>
+            <a:lstStyle/>
+            <a:p>
+              <a:pPr algn="ctr"/>
+              <a:endParaRPr lang="en-GB"/>
+            </a:p>
+          </p:txBody>
+        </p:sp>
+        <p:sp>
+          <p:nvSpPr>
+            <p:cNvPr id="8" name="Rectangle 7"/>
+            <p:cNvSpPr/>
+            <p:nvPr/>
+          </p:nvSpPr>
+          <p:spPr>
+            <a:xfrm>
+              <a:off x="8447714" y="5889071"/>
+              <a:ext cx="1711353" cy="662663"/>
+            </a:xfrm>
+            <a:prstGeom prst="rect">
+              <a:avLst/>
+            </a:prstGeom>
+            <a:noFill/>
+            <a:ln w="57150">
+              <a:solidFill>
+                <a:schemeClr val="accent5"/>
+              </a:solidFill>
+            </a:ln>
+          </p:spPr>
+          <p:style>
+            <a:lnRef idx="2">
+              <a:schemeClr val="accent1">
+                <a:shade val="50000"/>
+              </a:schemeClr>
+            </a:lnRef>
+            <a:fillRef idx="1">
+              <a:schemeClr val="accent1"/>
+            </a:fillRef>
+            <a:effectRef idx="0">
+              <a:schemeClr val="accent1"/>
+            </a:effectRef>
+            <a:fontRef idx="minor">
+              <a:schemeClr val="lt1"/>
+            </a:fontRef>
+          </p:style>
+          <p:txBody>
+            <a:bodyPr rtlCol="0" anchor="ctr"/>
+            <a:lstStyle/>
+            <a:p>
+              <a:pPr algn="ctr"/>
+              <a:endParaRPr lang="en-GB"/>
+            </a:p>
+          </p:txBody>
+        </p:sp>
+      </p:grpSp>
     </p:spTree>
     <p:extLst>
       <p:ext uri="{BB962C8B-B14F-4D97-AF65-F5344CB8AC3E}">
@@ -6012,6 +6126,26 @@
 </file>
 
 <file path=customXml/item1.xml><?xml version="1.0" encoding="utf-8"?>
+<p:properties xmlns:p="http://schemas.microsoft.com/office/2006/metadata/properties" xmlns:xsi="http://www.w3.org/2001/XMLSchema-instance" xmlns:pc="http://schemas.microsoft.com/office/infopath/2007/PartnerControls">
+  <documentManagement>
+    <VSO_x0020_item_x0020_id xmlns="40262f94-9f35-4ac3-9a90-690165a166b7" xsi:nil="true"/>
+    <Assetid_x0020_ xmlns="40262f94-9f35-4ac3-9a90-690165a166b7" xsi:nil="true"/>
+    <Item_x0020_Details xmlns="40262f94-9f35-4ac3-9a90-690165a166b7" xsi:nil="true"/>
+    <Template_x0020_details xmlns="40262f94-9f35-4ac3-9a90-690165a166b7" xsi:nil="true"/>
+  </documentManagement>
+</p:properties>
+</file>
+
+<file path=customXml/item2.xml><?xml version="1.0" encoding="utf-8"?>
+<?mso-contentType ?>
+<FormTemplates xmlns="http://schemas.microsoft.com/sharepoint/v3/contenttype/forms">
+  <Display>DocumentLibraryForm</Display>
+  <Edit>DocumentLibraryForm</Edit>
+  <New>DocumentLibraryForm</New>
+</FormTemplates>
+</file>
+
+<file path=customXml/item3.xml><?xml version="1.0" encoding="utf-8"?>
 <ct:contentTypeSchema xmlns:ct="http://schemas.microsoft.com/office/2006/metadata/contentType" xmlns:ma="http://schemas.microsoft.com/office/2006/metadata/properties/metaAttributes" ct:_="" ma:_="" ma:contentTypeName="Document" ma:contentTypeID="0x010100AA3F7D94069FF64A86F7DFF56D60E3BE" ma:contentTypeVersion="6" ma:contentTypeDescription="Create a new document." ma:contentTypeScope="" ma:versionID="c32302c77d4085ecf495bdddb7f5e889">
   <xsd:schema xmlns:xsd="http://www.w3.org/2001/XMLSchema" xmlns:xs="http://www.w3.org/2001/XMLSchema" xmlns:p="http://schemas.microsoft.com/office/2006/metadata/properties" xmlns:ns2="a4f35948-e619-41b3-aa29-22878b09cfd2" xmlns:ns3="40262f94-9f35-4ac3-9a90-690165a166b7" targetNamespace="http://schemas.microsoft.com/office/2006/metadata/properties" ma:root="true" ma:fieldsID="4ab5ae46be95f9d0be6107e8200be7a2" ns2:_="" ns3:_="">
     <xsd:import namespace="a4f35948-e619-41b3-aa29-22878b09cfd2"/>
@@ -6192,27 +6326,32 @@
 </ct:contentTypeSchema>
 </file>
 
-<file path=customXml/item2.xml><?xml version="1.0" encoding="utf-8"?>
-<?mso-contentType ?>
-<FormTemplates xmlns="http://schemas.microsoft.com/sharepoint/v3/contenttype/forms">
-  <Display>DocumentLibraryForm</Display>
-  <Edit>DocumentLibraryForm</Edit>
-  <New>DocumentLibraryForm</New>
-</FormTemplates>
+<file path=customXml/itemProps1.xml><?xml version="1.0" encoding="utf-8"?>
+<ds:datastoreItem xmlns:ds="http://schemas.openxmlformats.org/officeDocument/2006/customXml" ds:itemID="{40B0D886-CB8D-4564-A797-C05BC7D513A8}">
+  <ds:schemaRefs>
+    <ds:schemaRef ds:uri="http://purl.org/dc/terms/"/>
+    <ds:schemaRef ds:uri="http://purl.org/dc/elements/1.1/"/>
+    <ds:schemaRef ds:uri="http://www.w3.org/XML/1998/namespace"/>
+    <ds:schemaRef ds:uri="40262f94-9f35-4ac3-9a90-690165a166b7"/>
+    <ds:schemaRef ds:uri="http://schemas.microsoft.com/office/2006/documentManagement/types"/>
+    <ds:schemaRef ds:uri="http://schemas.microsoft.com/office/infopath/2007/PartnerControls"/>
+    <ds:schemaRef ds:uri="http://purl.org/dc/dcmitype/"/>
+    <ds:schemaRef ds:uri="http://schemas.microsoft.com/office/2006/metadata/properties"/>
+    <ds:schemaRef ds:uri="http://schemas.openxmlformats.org/package/2006/metadata/core-properties"/>
+    <ds:schemaRef ds:uri="a4f35948-e619-41b3-aa29-22878b09cfd2"/>
+  </ds:schemaRefs>
+</ds:datastoreItem>
 </file>
 
-<file path=customXml/item3.xml><?xml version="1.0" encoding="utf-8"?>
-<p:properties xmlns:p="http://schemas.microsoft.com/office/2006/metadata/properties" xmlns:xsi="http://www.w3.org/2001/XMLSchema-instance" xmlns:pc="http://schemas.microsoft.com/office/infopath/2007/PartnerControls">
-  <documentManagement>
-    <VSO_x0020_item_x0020_id xmlns="40262f94-9f35-4ac3-9a90-690165a166b7" xsi:nil="true"/>
-    <Assetid_x0020_ xmlns="40262f94-9f35-4ac3-9a90-690165a166b7" xsi:nil="true"/>
-    <Item_x0020_Details xmlns="40262f94-9f35-4ac3-9a90-690165a166b7" xsi:nil="true"/>
-    <Template_x0020_details xmlns="40262f94-9f35-4ac3-9a90-690165a166b7" xsi:nil="true"/>
-  </documentManagement>
-</p:properties>
+<file path=customXml/itemProps2.xml><?xml version="1.0" encoding="utf-8"?>
+<ds:datastoreItem xmlns:ds="http://schemas.openxmlformats.org/officeDocument/2006/customXml" ds:itemID="{FAC2023F-644C-4F7E-8E8C-CDBE4A63C7D1}">
+  <ds:schemaRefs>
+    <ds:schemaRef ds:uri="http://schemas.microsoft.com/sharepoint/v3/contenttype/forms"/>
+  </ds:schemaRefs>
+</ds:datastoreItem>
 </file>
 
-<file path=customXml/itemProps1.xml><?xml version="1.0" encoding="utf-8"?>
+<file path=customXml/itemProps3.xml><?xml version="1.0" encoding="utf-8"?>
 <ds:datastoreItem xmlns:ds="http://schemas.openxmlformats.org/officeDocument/2006/customXml" ds:itemID="{ED65A2C9-CB67-4F36-A412-EEC1AD297F3A}">
   <ds:schemaRefs>
     <ds:schemaRef ds:uri="http://schemas.microsoft.com/office/2006/metadata/contentType"/>
@@ -6229,29 +6368,4 @@
     <ds:schemaRef ds:uri="http://schemas.microsoft.com/internal/obd"/>
   </ds:schemaRefs>
 </ds:datastoreItem>
-</file>
-
-<file path=customXml/itemProps2.xml><?xml version="1.0" encoding="utf-8"?>
-<ds:datastoreItem xmlns:ds="http://schemas.openxmlformats.org/officeDocument/2006/customXml" ds:itemID="{FAC2023F-644C-4F7E-8E8C-CDBE4A63C7D1}">
-  <ds:schemaRefs>
-    <ds:schemaRef ds:uri="http://schemas.microsoft.com/sharepoint/v3/contenttype/forms"/>
-  </ds:schemaRefs>
-</ds:datastoreItem>
-</file>
-
-<file path=customXml/itemProps3.xml><?xml version="1.0" encoding="utf-8"?>
-<ds:datastoreItem xmlns:ds="http://schemas.openxmlformats.org/officeDocument/2006/customXml" ds:itemID="{40B0D886-CB8D-4564-A797-C05BC7D513A8}">
-  <ds:schemaRefs>
-    <ds:schemaRef ds:uri="http://purl.org/dc/terms/"/>
-    <ds:schemaRef ds:uri="http://purl.org/dc/elements/1.1/"/>
-    <ds:schemaRef ds:uri="http://www.w3.org/XML/1998/namespace"/>
-    <ds:schemaRef ds:uri="40262f94-9f35-4ac3-9a90-690165a166b7"/>
-    <ds:schemaRef ds:uri="http://schemas.microsoft.com/office/2006/documentManagement/types"/>
-    <ds:schemaRef ds:uri="http://schemas.microsoft.com/office/infopath/2007/PartnerControls"/>
-    <ds:schemaRef ds:uri="http://purl.org/dc/dcmitype/"/>
-    <ds:schemaRef ds:uri="http://schemas.microsoft.com/office/2006/metadata/properties"/>
-    <ds:schemaRef ds:uri="http://schemas.openxmlformats.org/package/2006/metadata/core-properties"/>
-    <ds:schemaRef ds:uri="a4f35948-e619-41b3-aa29-22878b09cfd2"/>
-  </ds:schemaRefs>
-</ds:datastoreItem>
 </file>
</xml_diff>